<commit_message>
gesture pptx test run
</commit_message>
<xml_diff>
--- a/gesture_pptx/test.pptx
+++ b/gesture_pptx/test.pptx
@@ -6,6 +6,10 @@
   </p:sldMasterIdLst>
   <p:sldIdLst>
     <p:sldId id="256" r:id="rId2"/>
+    <p:sldId id="257" r:id="rId3"/>
+    <p:sldId id="258" r:id="rId4"/>
+    <p:sldId id="259" r:id="rId5"/>
+    <p:sldId id="260" r:id="rId6"/>
   </p:sldIdLst>
   <p:sldSz cx="12192000" cy="6858000"/>
   <p:notesSz cx="6858000" cy="9144000"/>
@@ -104,6 +108,11 @@
       </a:defRPr>
     </a:lvl9pPr>
   </p:defaultTextStyle>
+  <p:extLst>
+    <p:ext uri="{EFAFB233-063F-42B5-8137-9DF3F51BA10A}">
+      <p15:sldGuideLst xmlns:p15="http://schemas.microsoft.com/office/powerpoint/2012/main"/>
+    </p:ext>
+  </p:extLst>
 </p:presentation>
 </file>
 
@@ -202,7 +211,7 @@
           <a:effectLst/>
           <a:extLst>
             <a:ext uri="{91240B29-F687-4f45-9708-019B960494DF}">
-              <a14:hiddenLine xmlns:a14="http://schemas.microsoft.com/office/drawing/2010/main" xmlns="" w="9525">
+              <a14:hiddenLine xmlns="" xmlns:a14="http://schemas.microsoft.com/office/drawing/2010/main" w="9525">
                 <a:solidFill>
                   <a:srgbClr val="000000"/>
                 </a:solidFill>
@@ -395,7 +404,7 @@
             <a:fld id="{08B9EBBA-996F-894A-B54A-D6246ED52CEA}" type="datetimeFigureOut">
               <a:rPr lang="en-US" dirty="0"/>
               <a:pPr/>
-              <a:t>11/28/23</a:t>
+              <a:t>12/2/23</a:t>
             </a:fld>
             <a:endParaRPr lang="en-US" dirty="0"/>
           </a:p>
@@ -710,7 +719,7 @@
             <a:fld id="{18C79C5D-2A6F-F04D-97DA-BEF2467B64E4}" type="datetimeFigureOut">
               <a:rPr lang="en-US" dirty="0"/>
               <a:pPr/>
-              <a:t>11/28/23</a:t>
+              <a:t>12/2/23</a:t>
             </a:fld>
             <a:endParaRPr lang="en-US" dirty="0"/>
           </a:p>
@@ -1195,7 +1204,7 @@
             <a:fld id="{8DFA1846-DA80-1C48-A609-854EA85C59AD}" type="datetimeFigureOut">
               <a:rPr lang="en-US" dirty="0"/>
               <a:pPr/>
-              <a:t>11/28/23</a:t>
+              <a:t>12/2/23</a:t>
             </a:fld>
             <a:endParaRPr lang="en-US" dirty="0"/>
           </a:p>
@@ -1561,7 +1570,7 @@
             <a:fld id="{FBF54567-0DE4-3F47-BF90-CB84690072F9}" type="datetimeFigureOut">
               <a:rPr lang="en-US" dirty="0"/>
               <a:pPr/>
-              <a:t>11/28/23</a:t>
+              <a:t>12/2/23</a:t>
             </a:fld>
             <a:endParaRPr lang="en-US" dirty="0"/>
           </a:p>
@@ -1712,7 +1721,7 @@
           <a:ln/>
           <a:extLst>
             <a:ext uri="{91240B29-F687-4f45-9708-019B960494DF}">
-              <a14:hiddenLine xmlns:a14="http://schemas.microsoft.com/office/drawing/2010/main" xmlns="" w="9525">
+              <a14:hiddenLine xmlns="" xmlns:a14="http://schemas.microsoft.com/office/drawing/2010/main" w="9525">
                 <a:solidFill>
                   <a:srgbClr val="000000"/>
                 </a:solidFill>
@@ -1831,7 +1840,7 @@
             <a:fld id="{C6C52C72-DE31-F449-A4ED-4C594FD91407}" type="datetimeFigureOut">
               <a:rPr lang="en-US" dirty="0"/>
               <a:pPr/>
-              <a:t>11/28/23</a:t>
+              <a:t>12/2/23</a:t>
             </a:fld>
             <a:endParaRPr lang="en-US" dirty="0"/>
           </a:p>
@@ -1984,7 +1993,7 @@
           <a:ln/>
           <a:extLst>
             <a:ext uri="{91240B29-F687-4f45-9708-019B960494DF}">
-              <a14:hiddenLine xmlns:a14="http://schemas.microsoft.com/office/drawing/2010/main" xmlns="" w="9525">
+              <a14:hiddenLine xmlns="" xmlns:a14="http://schemas.microsoft.com/office/drawing/2010/main" w="9525">
                 <a:solidFill>
                   <a:srgbClr val="000000"/>
                 </a:solidFill>
@@ -2113,7 +2122,7 @@
             <a:fld id="{ED62726E-379B-B349-9EED-81ED093FA806}" type="datetimeFigureOut">
               <a:rPr lang="en-US" dirty="0"/>
               <a:pPr/>
-              <a:t>11/28/23</a:t>
+              <a:t>12/2/23</a:t>
             </a:fld>
             <a:endParaRPr lang="en-US" dirty="0"/>
           </a:p>
@@ -2264,7 +2273,7 @@
           <a:ln/>
           <a:extLst>
             <a:ext uri="{91240B29-F687-4f45-9708-019B960494DF}">
-              <a14:hiddenLine xmlns:a14="http://schemas.microsoft.com/office/drawing/2010/main" xmlns="" w="9525">
+              <a14:hiddenLine xmlns="" xmlns:a14="http://schemas.microsoft.com/office/drawing/2010/main" w="9525">
                 <a:solidFill>
                   <a:srgbClr val="000000"/>
                 </a:solidFill>
@@ -2393,7 +2402,7 @@
             <a:fld id="{9B3A1323-8D79-1946-B0D7-40001CF92E9D}" type="datetimeFigureOut">
               <a:rPr lang="en-US" dirty="0"/>
               <a:pPr/>
-              <a:t>11/28/23</a:t>
+              <a:t>12/2/23</a:t>
             </a:fld>
             <a:endParaRPr lang="en-US" dirty="0"/>
           </a:p>
@@ -2733,7 +2742,7 @@
             <a:fld id="{8DFA1846-DA80-1C48-A609-854EA85C59AD}" type="datetimeFigureOut">
               <a:rPr lang="en-US" dirty="0"/>
               <a:pPr/>
-              <a:t>11/28/23</a:t>
+              <a:t>12/2/23</a:t>
             </a:fld>
             <a:endParaRPr lang="en-US" dirty="0"/>
           </a:p>
@@ -2884,7 +2893,7 @@
           <a:ln/>
           <a:extLst>
             <a:ext uri="{91240B29-F687-4f45-9708-019B960494DF}">
-              <a14:hiddenLine xmlns:a14="http://schemas.microsoft.com/office/drawing/2010/main" xmlns="" w="9525">
+              <a14:hiddenLine xmlns="" xmlns:a14="http://schemas.microsoft.com/office/drawing/2010/main" w="9525">
                 <a:solidFill>
                   <a:srgbClr val="000000"/>
                 </a:solidFill>
@@ -3069,7 +3078,7 @@
             <a:fld id="{57302355-E14B-8545-A8F8-0FE83CC9D524}" type="datetimeFigureOut">
               <a:rPr lang="en-US" dirty="0"/>
               <a:pPr/>
-              <a:t>11/28/23</a:t>
+              <a:t>12/2/23</a:t>
             </a:fld>
             <a:endParaRPr lang="en-US" dirty="0"/>
           </a:p>
@@ -3220,7 +3229,7 @@
           <a:ln/>
           <a:extLst>
             <a:ext uri="{91240B29-F687-4f45-9708-019B960494DF}">
-              <a14:hiddenLine xmlns:a14="http://schemas.microsoft.com/office/drawing/2010/main" xmlns="" w="9525">
+              <a14:hiddenLine xmlns="" xmlns:a14="http://schemas.microsoft.com/office/drawing/2010/main" w="9525">
                 <a:solidFill>
                   <a:srgbClr val="000000"/>
                 </a:solidFill>
@@ -3543,7 +3552,7 @@
             <a:fld id="{02640F58-564D-2B4F-AE67-E407BA4FCF45}" type="datetimeFigureOut">
               <a:rPr lang="en-US" dirty="0"/>
               <a:pPr/>
-              <a:t>11/28/23</a:t>
+              <a:t>12/2/23</a:t>
             </a:fld>
             <a:endParaRPr lang="en-US" dirty="0"/>
           </a:p>
@@ -3694,7 +3703,7 @@
           <a:ln/>
           <a:extLst>
             <a:ext uri="{91240B29-F687-4f45-9708-019B960494DF}">
-              <a14:hiddenLine xmlns:a14="http://schemas.microsoft.com/office/drawing/2010/main" xmlns="" w="9525">
+              <a14:hiddenLine xmlns="" xmlns:a14="http://schemas.microsoft.com/office/drawing/2010/main" w="9525">
                 <a:solidFill>
                   <a:srgbClr val="000000"/>
                 </a:solidFill>
@@ -3761,7 +3770,7 @@
             <a:fld id="{F13A34C8-038E-2045-AF43-DF7DBB8E0E9E}" type="datetimeFigureOut">
               <a:rPr lang="en-US" dirty="0"/>
               <a:pPr/>
-              <a:t>11/28/23</a:t>
+              <a:t>12/2/23</a:t>
             </a:fld>
             <a:endParaRPr lang="en-US" dirty="0"/>
           </a:p>
@@ -3853,7 +3862,7 @@
             <a:fld id="{8818C68F-D26B-8F47-958C-23B49CF8A634}" type="datetimeFigureOut">
               <a:rPr lang="en-US" dirty="0"/>
               <a:pPr/>
-              <a:t>11/28/23</a:t>
+              <a:t>12/2/23</a:t>
             </a:fld>
             <a:endParaRPr lang="en-US" dirty="0"/>
           </a:p>
@@ -4117,7 +4126,7 @@
           <a:ln/>
           <a:extLst>
             <a:ext uri="{91240B29-F687-4f45-9708-019B960494DF}">
-              <a14:hiddenLine xmlns:a14="http://schemas.microsoft.com/office/drawing/2010/main" xmlns="" w="9525">
+              <a14:hiddenLine xmlns="" xmlns:a14="http://schemas.microsoft.com/office/drawing/2010/main" w="9525">
                 <a:solidFill>
                   <a:srgbClr val="000000"/>
                 </a:solidFill>
@@ -4317,7 +4326,7 @@
             <a:fld id="{D0DF5E60-9974-AC48-9591-99C2BB44B7CF}" type="datetimeFigureOut">
               <a:rPr lang="en-US" dirty="0"/>
               <a:pPr/>
-              <a:t>11/28/23</a:t>
+              <a:t>12/2/23</a:t>
             </a:fld>
             <a:endParaRPr lang="en-US" dirty="0"/>
           </a:p>
@@ -4627,7 +4636,7 @@
             <a:fld id="{18C79C5D-2A6F-F04D-97DA-BEF2467B64E4}" type="datetimeFigureOut">
               <a:rPr lang="en-US" dirty="0"/>
               <a:pPr/>
-              <a:t>11/28/23</a:t>
+              <a:t>12/2/23</a:t>
             </a:fld>
             <a:endParaRPr lang="en-US" dirty="0"/>
           </a:p>
@@ -4894,7 +4903,7 @@
             <a:fld id="{09B482E8-6E0E-1B4F-B1FD-C69DB9E858D9}" type="datetimeFigureOut">
               <a:rPr lang="en-US" dirty="0"/>
               <a:pPr/>
-              <a:t>11/28/23</a:t>
+              <a:t>12/2/23</a:t>
             </a:fld>
             <a:endParaRPr lang="en-US" dirty="0"/>
           </a:p>
@@ -5361,7 +5370,10 @@
           <a:bodyPr/>
           <a:lstStyle/>
           <a:p>
-            <a:endParaRPr lang="en-US"/>
+            <a:r>
+              <a:rPr lang="en-US" dirty="0"/>
+              <a:t>Example Slides</a:t>
+            </a:r>
           </a:p>
         </p:txBody>
       </p:sp>
@@ -5394,6 +5406,372 @@
     <p:extLst>
       <p:ext uri="{BB962C8B-B14F-4D97-AF65-F5344CB8AC3E}">
         <p14:creationId xmlns:p14="http://schemas.microsoft.com/office/powerpoint/2010/main" val="3506264127"/>
+      </p:ext>
+    </p:extLst>
+  </p:cSld>
+  <p:clrMapOvr>
+    <a:masterClrMapping/>
+  </p:clrMapOvr>
+</p:sld>
+</file>
+
+<file path=ppt/slides/slide2.xml><?xml version="1.0" encoding="utf-8"?>
+<p:sld xmlns:a="http://schemas.openxmlformats.org/drawingml/2006/main" xmlns:r="http://schemas.openxmlformats.org/officeDocument/2006/relationships" xmlns:p="http://schemas.openxmlformats.org/presentationml/2006/main">
+  <p:cSld>
+    <p:spTree>
+      <p:nvGrpSpPr>
+        <p:cNvPr id="1" name=""/>
+        <p:cNvGrpSpPr/>
+        <p:nvPr/>
+      </p:nvGrpSpPr>
+      <p:grpSpPr>
+        <a:xfrm>
+          <a:off x="0" y="0"/>
+          <a:ext cx="0" cy="0"/>
+          <a:chOff x="0" y="0"/>
+          <a:chExt cx="0" cy="0"/>
+        </a:xfrm>
+      </p:grpSpPr>
+      <p:sp>
+        <p:nvSpPr>
+          <p:cNvPr id="2" name="Title 1">
+            <a:extLst>
+              <a:ext uri="{FF2B5EF4-FFF2-40B4-BE49-F238E27FC236}">
+                <a16:creationId xmlns:a16="http://schemas.microsoft.com/office/drawing/2014/main" id="{6C3EE96F-6D3F-8372-8AEF-D5AE1E42FACB}"/>
+              </a:ext>
+            </a:extLst>
+          </p:cNvPr>
+          <p:cNvSpPr>
+            <a:spLocks noGrp="1"/>
+          </p:cNvSpPr>
+          <p:nvPr>
+            <p:ph type="title"/>
+          </p:nvPr>
+        </p:nvSpPr>
+        <p:spPr/>
+        <p:txBody>
+          <a:bodyPr/>
+          <a:lstStyle/>
+          <a:p>
+            <a:r>
+              <a:rPr lang="en-US" dirty="0"/>
+              <a:t>Slide 1</a:t>
+            </a:r>
+          </a:p>
+        </p:txBody>
+      </p:sp>
+      <p:sp>
+        <p:nvSpPr>
+          <p:cNvPr id="3" name="Content Placeholder 2">
+            <a:extLst>
+              <a:ext uri="{FF2B5EF4-FFF2-40B4-BE49-F238E27FC236}">
+                <a16:creationId xmlns:a16="http://schemas.microsoft.com/office/drawing/2014/main" id="{4C187B0B-B358-B5D6-A9B0-89E0DA11F33A}"/>
+              </a:ext>
+            </a:extLst>
+          </p:cNvPr>
+          <p:cNvSpPr>
+            <a:spLocks noGrp="1"/>
+          </p:cNvSpPr>
+          <p:nvPr>
+            <p:ph idx="1"/>
+          </p:nvPr>
+        </p:nvSpPr>
+        <p:spPr/>
+        <p:txBody>
+          <a:bodyPr/>
+          <a:lstStyle/>
+          <a:p>
+            <a:r>
+              <a:rPr lang="en-US" dirty="0"/>
+              <a:t>TEST</a:t>
+            </a:r>
+          </a:p>
+        </p:txBody>
+      </p:sp>
+    </p:spTree>
+    <p:extLst>
+      <p:ext uri="{BB962C8B-B14F-4D97-AF65-F5344CB8AC3E}">
+        <p14:creationId xmlns:p14="http://schemas.microsoft.com/office/powerpoint/2010/main" val="3812212575"/>
+      </p:ext>
+    </p:extLst>
+  </p:cSld>
+  <p:clrMapOvr>
+    <a:masterClrMapping/>
+  </p:clrMapOvr>
+</p:sld>
+</file>
+
+<file path=ppt/slides/slide3.xml><?xml version="1.0" encoding="utf-8"?>
+<p:sld xmlns:a="http://schemas.openxmlformats.org/drawingml/2006/main" xmlns:r="http://schemas.openxmlformats.org/officeDocument/2006/relationships" xmlns:p="http://schemas.openxmlformats.org/presentationml/2006/main">
+  <p:cSld>
+    <p:spTree>
+      <p:nvGrpSpPr>
+        <p:cNvPr id="1" name=""/>
+        <p:cNvGrpSpPr/>
+        <p:nvPr/>
+      </p:nvGrpSpPr>
+      <p:grpSpPr>
+        <a:xfrm>
+          <a:off x="0" y="0"/>
+          <a:ext cx="0" cy="0"/>
+          <a:chOff x="0" y="0"/>
+          <a:chExt cx="0" cy="0"/>
+        </a:xfrm>
+      </p:grpSpPr>
+      <p:sp>
+        <p:nvSpPr>
+          <p:cNvPr id="2" name="Title 1">
+            <a:extLst>
+              <a:ext uri="{FF2B5EF4-FFF2-40B4-BE49-F238E27FC236}">
+                <a16:creationId xmlns:a16="http://schemas.microsoft.com/office/drawing/2014/main" id="{D72E3126-2973-FDE4-1127-667E971067F7}"/>
+              </a:ext>
+            </a:extLst>
+          </p:cNvPr>
+          <p:cNvSpPr>
+            <a:spLocks noGrp="1"/>
+          </p:cNvSpPr>
+          <p:nvPr>
+            <p:ph type="title"/>
+          </p:nvPr>
+        </p:nvSpPr>
+        <p:spPr/>
+        <p:txBody>
+          <a:bodyPr/>
+          <a:lstStyle/>
+          <a:p>
+            <a:r>
+              <a:rPr lang="en-US" dirty="0"/>
+              <a:t>Slide 2</a:t>
+            </a:r>
+          </a:p>
+        </p:txBody>
+      </p:sp>
+      <p:sp>
+        <p:nvSpPr>
+          <p:cNvPr id="3" name="Text Placeholder 2">
+            <a:extLst>
+              <a:ext uri="{FF2B5EF4-FFF2-40B4-BE49-F238E27FC236}">
+                <a16:creationId xmlns:a16="http://schemas.microsoft.com/office/drawing/2014/main" id="{A7082A98-4D8C-B109-7B2A-7A098AB3DA4D}"/>
+              </a:ext>
+            </a:extLst>
+          </p:cNvPr>
+          <p:cNvSpPr>
+            <a:spLocks noGrp="1"/>
+          </p:cNvSpPr>
+          <p:nvPr>
+            <p:ph type="body" sz="quarter" idx="16"/>
+          </p:nvPr>
+        </p:nvSpPr>
+        <p:spPr/>
+        <p:txBody>
+          <a:bodyPr/>
+          <a:lstStyle/>
+          <a:p>
+            <a:r>
+              <a:rPr lang="en-US" dirty="0"/>
+              <a:t>Test</a:t>
+            </a:r>
+          </a:p>
+        </p:txBody>
+      </p:sp>
+    </p:spTree>
+    <p:extLst>
+      <p:ext uri="{BB962C8B-B14F-4D97-AF65-F5344CB8AC3E}">
+        <p14:creationId xmlns:p14="http://schemas.microsoft.com/office/powerpoint/2010/main" val="1431234377"/>
+      </p:ext>
+    </p:extLst>
+  </p:cSld>
+  <p:clrMapOvr>
+    <a:masterClrMapping/>
+  </p:clrMapOvr>
+</p:sld>
+</file>
+
+<file path=ppt/slides/slide4.xml><?xml version="1.0" encoding="utf-8"?>
+<p:sld xmlns:a="http://schemas.openxmlformats.org/drawingml/2006/main" xmlns:r="http://schemas.openxmlformats.org/officeDocument/2006/relationships" xmlns:p="http://schemas.openxmlformats.org/presentationml/2006/main">
+  <p:cSld>
+    <p:spTree>
+      <p:nvGrpSpPr>
+        <p:cNvPr id="1" name=""/>
+        <p:cNvGrpSpPr/>
+        <p:nvPr/>
+      </p:nvGrpSpPr>
+      <p:grpSpPr>
+        <a:xfrm>
+          <a:off x="0" y="0"/>
+          <a:ext cx="0" cy="0"/>
+          <a:chOff x="0" y="0"/>
+          <a:chExt cx="0" cy="0"/>
+        </a:xfrm>
+      </p:grpSpPr>
+      <p:sp>
+        <p:nvSpPr>
+          <p:cNvPr id="2" name="Vertical Title 1">
+            <a:extLst>
+              <a:ext uri="{FF2B5EF4-FFF2-40B4-BE49-F238E27FC236}">
+                <a16:creationId xmlns:a16="http://schemas.microsoft.com/office/drawing/2014/main" id="{3C7783BF-E548-B613-AE81-27937F3695C4}"/>
+              </a:ext>
+            </a:extLst>
+          </p:cNvPr>
+          <p:cNvSpPr>
+            <a:spLocks noGrp="1"/>
+          </p:cNvSpPr>
+          <p:nvPr>
+            <p:ph type="title" orient="vert"/>
+          </p:nvPr>
+        </p:nvSpPr>
+        <p:spPr/>
+        <p:txBody>
+          <a:bodyPr/>
+          <a:lstStyle/>
+          <a:p>
+            <a:r>
+              <a:rPr lang="en-US" dirty="0"/>
+              <a:t>Slide 3</a:t>
+            </a:r>
+          </a:p>
+        </p:txBody>
+      </p:sp>
+      <p:sp>
+        <p:nvSpPr>
+          <p:cNvPr id="3" name="Vertical Text Placeholder 2">
+            <a:extLst>
+              <a:ext uri="{FF2B5EF4-FFF2-40B4-BE49-F238E27FC236}">
+                <a16:creationId xmlns:a16="http://schemas.microsoft.com/office/drawing/2014/main" id="{A9BE68A5-135D-CC04-A11A-559F0CC22763}"/>
+              </a:ext>
+            </a:extLst>
+          </p:cNvPr>
+          <p:cNvSpPr>
+            <a:spLocks noGrp="1"/>
+          </p:cNvSpPr>
+          <p:nvPr>
+            <p:ph type="body" orient="vert" idx="1"/>
+          </p:nvPr>
+        </p:nvSpPr>
+        <p:spPr/>
+        <p:txBody>
+          <a:bodyPr/>
+          <a:lstStyle/>
+          <a:p>
+            <a:r>
+              <a:rPr lang="en-US" dirty="0"/>
+              <a:t>Test</a:t>
+            </a:r>
+          </a:p>
+        </p:txBody>
+      </p:sp>
+    </p:spTree>
+    <p:extLst>
+      <p:ext uri="{BB962C8B-B14F-4D97-AF65-F5344CB8AC3E}">
+        <p14:creationId xmlns:p14="http://schemas.microsoft.com/office/powerpoint/2010/main" val="368509899"/>
+      </p:ext>
+    </p:extLst>
+  </p:cSld>
+  <p:clrMapOvr>
+    <a:masterClrMapping/>
+  </p:clrMapOvr>
+</p:sld>
+</file>
+
+<file path=ppt/slides/slide5.xml><?xml version="1.0" encoding="utf-8"?>
+<p:sld xmlns:a="http://schemas.openxmlformats.org/drawingml/2006/main" xmlns:r="http://schemas.openxmlformats.org/officeDocument/2006/relationships" xmlns:p="http://schemas.openxmlformats.org/presentationml/2006/main">
+  <p:cSld>
+    <p:spTree>
+      <p:nvGrpSpPr>
+        <p:cNvPr id="1" name=""/>
+        <p:cNvGrpSpPr/>
+        <p:nvPr/>
+      </p:nvGrpSpPr>
+      <p:grpSpPr>
+        <a:xfrm>
+          <a:off x="0" y="0"/>
+          <a:ext cx="0" cy="0"/>
+          <a:chOff x="0" y="0"/>
+          <a:chExt cx="0" cy="0"/>
+        </a:xfrm>
+      </p:grpSpPr>
+      <p:sp>
+        <p:nvSpPr>
+          <p:cNvPr id="2" name="Title 1">
+            <a:extLst>
+              <a:ext uri="{FF2B5EF4-FFF2-40B4-BE49-F238E27FC236}">
+                <a16:creationId xmlns:a16="http://schemas.microsoft.com/office/drawing/2014/main" id="{FEBF4139-348F-A9B1-B3BA-FBABE83D6185}"/>
+              </a:ext>
+            </a:extLst>
+          </p:cNvPr>
+          <p:cNvSpPr>
+            <a:spLocks noGrp="1"/>
+          </p:cNvSpPr>
+          <p:nvPr>
+            <p:ph type="title"/>
+          </p:nvPr>
+        </p:nvSpPr>
+        <p:spPr/>
+        <p:txBody>
+          <a:bodyPr/>
+          <a:lstStyle/>
+          <a:p>
+            <a:r>
+              <a:rPr lang="en-US" dirty="0"/>
+              <a:t>Last Slide</a:t>
+            </a:r>
+          </a:p>
+        </p:txBody>
+      </p:sp>
+      <p:sp>
+        <p:nvSpPr>
+          <p:cNvPr id="3" name="Text Placeholder 2">
+            <a:extLst>
+              <a:ext uri="{FF2B5EF4-FFF2-40B4-BE49-F238E27FC236}">
+                <a16:creationId xmlns:a16="http://schemas.microsoft.com/office/drawing/2014/main" id="{9CB0FE11-F618-A454-3C41-8557575DE863}"/>
+              </a:ext>
+            </a:extLst>
+          </p:cNvPr>
+          <p:cNvSpPr>
+            <a:spLocks noGrp="1"/>
+          </p:cNvSpPr>
+          <p:nvPr>
+            <p:ph type="body" idx="1"/>
+          </p:nvPr>
+        </p:nvSpPr>
+        <p:spPr/>
+        <p:txBody>
+          <a:bodyPr/>
+          <a:lstStyle/>
+          <a:p>
+            <a:endParaRPr lang="en-US"/>
+          </a:p>
+        </p:txBody>
+      </p:sp>
+      <p:sp>
+        <p:nvSpPr>
+          <p:cNvPr id="4" name="Text Placeholder 3">
+            <a:extLst>
+              <a:ext uri="{FF2B5EF4-FFF2-40B4-BE49-F238E27FC236}">
+                <a16:creationId xmlns:a16="http://schemas.microsoft.com/office/drawing/2014/main" id="{775DE551-1687-A0F5-AAE9-B44B09058003}"/>
+              </a:ext>
+            </a:extLst>
+          </p:cNvPr>
+          <p:cNvSpPr>
+            <a:spLocks noGrp="1"/>
+          </p:cNvSpPr>
+          <p:nvPr>
+            <p:ph type="body" sz="quarter" idx="16"/>
+          </p:nvPr>
+        </p:nvSpPr>
+        <p:spPr/>
+        <p:txBody>
+          <a:bodyPr/>
+          <a:lstStyle/>
+          <a:p>
+            <a:endParaRPr lang="en-US"/>
+          </a:p>
+        </p:txBody>
+      </p:sp>
+    </p:spTree>
+    <p:extLst>
+      <p:ext uri="{BB962C8B-B14F-4D97-AF65-F5344CB8AC3E}">
+        <p14:creationId xmlns:p14="http://schemas.microsoft.com/office/powerpoint/2010/main" val="1758474750"/>
       </p:ext>
     </p:extLst>
   </p:cSld>

</xml_diff>